<commit_message>
Uploaded ppt for the project
</commit_message>
<xml_diff>
--- a/Sharpify.pptx
+++ b/Sharpify.pptx
@@ -135,6 +135,43 @@
 <p188:authorLst xmlns:a="http://schemas.openxmlformats.org/drawingml/2006/main" xmlns:r="http://schemas.openxmlformats.org/officeDocument/2006/relationships" xmlns:p188="http://schemas.microsoft.com/office/powerpoint/2018/8/main">
   <p188:author id="{00000000-0000-0000-0000-000000000000}" name="Author" initials="A" userId="Author" providerId="AD"/>
 </p188:authorLst>
+</file>
+
+<file path=ppt/revisionInfo.xml><?xml version="1.0" encoding="utf-8"?>
+<p1510:revInfo xmlns:a="http://schemas.openxmlformats.org/drawingml/2006/main" xmlns:r="http://schemas.openxmlformats.org/officeDocument/2006/relationships" xmlns:p1510="http://schemas.microsoft.com/office/powerpoint/2015/10/main">
+  <p1510:revLst>
+    <p1510:client id="{D8878F65-7AB4-48C1-9536-C2A9B7322A3A}" v="4" dt="2025-04-03T15:34:19.874"/>
+  </p1510:revLst>
+</p1510:revInfo>
+</file>
+
+<file path=ppt/changesInfos/changesInfo1.xml><?xml version="1.0" encoding="utf-8"?>
+<pc:chgInfo xmlns:a="http://schemas.openxmlformats.org/drawingml/2006/main" xmlns:r="http://schemas.openxmlformats.org/officeDocument/2006/relationships" xmlns:ac="http://schemas.microsoft.com/office/drawing/2013/main/command" xmlns:pc="http://schemas.microsoft.com/office/powerpoint/2013/main/command">
+  <pc:docChgLst>
+    <pc:chgData name="Harsh Prasad" userId="2ad9fc3f20fb068c" providerId="LiveId" clId="{D8878F65-7AB4-48C1-9536-C2A9B7322A3A}"/>
+    <pc:docChg chg="modSld">
+      <pc:chgData name="Harsh Prasad" userId="2ad9fc3f20fb068c" providerId="LiveId" clId="{D8878F65-7AB4-48C1-9536-C2A9B7322A3A}" dt="2025-04-03T15:34:19.872" v="4"/>
+      <pc:docMkLst>
+        <pc:docMk/>
+      </pc:docMkLst>
+      <pc:sldChg chg="modSp mod">
+        <pc:chgData name="Harsh Prasad" userId="2ad9fc3f20fb068c" providerId="LiveId" clId="{D8878F65-7AB4-48C1-9536-C2A9B7322A3A}" dt="2025-04-03T15:34:19.872" v="4"/>
+        <pc:sldMkLst>
+          <pc:docMk/>
+          <pc:sldMk cId="1503650227" sldId="1882"/>
+        </pc:sldMkLst>
+        <pc:picChg chg="mod ord">
+          <ac:chgData name="Harsh Prasad" userId="2ad9fc3f20fb068c" providerId="LiveId" clId="{D8878F65-7AB4-48C1-9536-C2A9B7322A3A}" dt="2025-04-03T15:34:19.872" v="4"/>
+          <ac:picMkLst>
+            <pc:docMk/>
+            <pc:sldMk cId="1503650227" sldId="1882"/>
+            <ac:picMk id="2050" creationId="{BFA9FA35-6142-3868-BA0B-862754CBFE4B}"/>
+          </ac:picMkLst>
+        </pc:picChg>
+      </pc:sldChg>
+    </pc:docChg>
+  </pc:docChgLst>
+</pc:chgInfo>
 </file>
 
 <file path=ppt/notesMasters/notesMaster1.xml><?xml version="1.0" encoding="utf-8"?>
@@ -11562,6 +11599,45 @@
           </a:p>
         </p:txBody>
       </p:sp>
+      <p:sp>
+        <p:nvSpPr>
+          <p:cNvPr id="3" name="TextBox 2">
+            <a:extLst>
+              <a:ext uri="{FF2B5EF4-FFF2-40B4-BE49-F238E27FC236}">
+                <a16:creationId xmlns:a16="http://schemas.microsoft.com/office/drawing/2014/main" id="{85682190-18F0-B693-3B13-5DAB33BAD56D}"/>
+              </a:ext>
+            </a:extLst>
+          </p:cNvPr>
+          <p:cNvSpPr txBox="1"/>
+          <p:nvPr/>
+        </p:nvSpPr>
+        <p:spPr>
+          <a:xfrm>
+            <a:off x="7088697" y="1597262"/>
+            <a:ext cx="3993160" cy="384721"/>
+          </a:xfrm>
+          <a:prstGeom prst="rect">
+            <a:avLst/>
+          </a:prstGeom>
+          <a:noFill/>
+        </p:spPr>
+        <p:txBody>
+          <a:bodyPr wrap="square" rtlCol="0">
+            <a:spAutoFit/>
+          </a:bodyPr>
+          <a:lstStyle/>
+          <a:p>
+            <a:r>
+              <a:rPr lang="en-IN" sz="1900" dirty="0">
+                <a:solidFill>
+                  <a:srgbClr val="005F73"/>
+                </a:solidFill>
+              </a:rPr>
+              <a:t>Enhanced image clarity</a:t>
+            </a:r>
+          </a:p>
+        </p:txBody>
+      </p:sp>
       <p:pic>
         <p:nvPicPr>
           <p:cNvPr id="2050" name="Picture 2" descr="Advantage, Benefits Icon. Graphic by dhimubs124s · Creative Fabrica">
@@ -11579,16 +11655,19 @@
         <p:blipFill>
           <a:blip r:embed="rId2">
             <a:duotone>
-              <a:prstClr val="black"/>
-              <a:srgbClr val="005F73">
-                <a:tint val="45000"/>
-                <a:satMod val="400000"/>
-              </a:srgbClr>
+              <a:schemeClr val="accent6">
+                <a:shade val="45000"/>
+                <a:satMod val="135000"/>
+              </a:schemeClr>
+              <a:prstClr val="white"/>
             </a:duotone>
             <a:extLst>
               <a:ext uri="{BEBA8EAE-BF5A-486C-A8C5-ECC9F3942E4B}">
                 <a14:imgProps xmlns:a14="http://schemas.microsoft.com/office/drawing/2010/main">
                   <a14:imgLayer r:embed="rId3">
+                    <a14:imgEffect>
+                      <a14:artisticGlowEdges/>
+                    </a14:imgEffect>
                     <a14:imgEffect>
                       <a14:colorTemperature colorTemp="11200"/>
                     </a14:imgEffect>
@@ -11622,45 +11701,6 @@
           </a:ln>
         </p:spPr>
       </p:pic>
-      <p:sp>
-        <p:nvSpPr>
-          <p:cNvPr id="3" name="TextBox 2">
-            <a:extLst>
-              <a:ext uri="{FF2B5EF4-FFF2-40B4-BE49-F238E27FC236}">
-                <a16:creationId xmlns:a16="http://schemas.microsoft.com/office/drawing/2014/main" id="{85682190-18F0-B693-3B13-5DAB33BAD56D}"/>
-              </a:ext>
-            </a:extLst>
-          </p:cNvPr>
-          <p:cNvSpPr txBox="1"/>
-          <p:nvPr/>
-        </p:nvSpPr>
-        <p:spPr>
-          <a:xfrm>
-            <a:off x="7088697" y="1597262"/>
-            <a:ext cx="3993160" cy="384721"/>
-          </a:xfrm>
-          <a:prstGeom prst="rect">
-            <a:avLst/>
-          </a:prstGeom>
-          <a:noFill/>
-        </p:spPr>
-        <p:txBody>
-          <a:bodyPr wrap="square" rtlCol="0">
-            <a:spAutoFit/>
-          </a:bodyPr>
-          <a:lstStyle/>
-          <a:p>
-            <a:r>
-              <a:rPr lang="en-IN" sz="1900" dirty="0">
-                <a:solidFill>
-                  <a:srgbClr val="005F73"/>
-                </a:solidFill>
-              </a:rPr>
-              <a:t>Enhanced image clarity</a:t>
-            </a:r>
-          </a:p>
-        </p:txBody>
-      </p:sp>
       <p:sp>
         <p:nvSpPr>
           <p:cNvPr id="7" name="TextBox 6">

</xml_diff>

<commit_message>
Updated the ppt for this project
</commit_message>
<xml_diff>
--- a/Sharpify.pptx
+++ b/Sharpify.pptx
@@ -5,15 +5,17 @@
     <p:sldMasterId id="2147483662" r:id="rId1"/>
   </p:sldMasterIdLst>
   <p:notesMasterIdLst>
-    <p:notesMasterId r:id="rId8"/>
+    <p:notesMasterId r:id="rId10"/>
   </p:notesMasterIdLst>
   <p:sldIdLst>
     <p:sldId id="1938" r:id="rId2"/>
     <p:sldId id="1924" r:id="rId3"/>
     <p:sldId id="1882" r:id="rId4"/>
-    <p:sldId id="1941" r:id="rId5"/>
-    <p:sldId id="1939" r:id="rId6"/>
-    <p:sldId id="1940" r:id="rId7"/>
+    <p:sldId id="1942" r:id="rId5"/>
+    <p:sldId id="1943" r:id="rId6"/>
+    <p:sldId id="1941" r:id="rId7"/>
+    <p:sldId id="1939" r:id="rId8"/>
+    <p:sldId id="1940" r:id="rId9"/>
   </p:sldIdLst>
   <p:sldSz cx="12192000" cy="6858000"/>
   <p:notesSz cx="6858000" cy="9144000"/>
@@ -140,7 +142,7 @@
 <file path=ppt/revisionInfo.xml><?xml version="1.0" encoding="utf-8"?>
 <p1510:revInfo xmlns:a="http://schemas.openxmlformats.org/drawingml/2006/main" xmlns:r="http://schemas.openxmlformats.org/officeDocument/2006/relationships" xmlns:p1510="http://schemas.microsoft.com/office/powerpoint/2015/10/main">
   <p1510:revLst>
-    <p1510:client id="{D8878F65-7AB4-48C1-9536-C2A9B7322A3A}" v="4" dt="2025-04-03T15:34:19.874"/>
+    <p1510:client id="{D8878F65-7AB4-48C1-9536-C2A9B7322A3A}" v="18" dt="2025-04-03T18:14:41.789"/>
   </p1510:revLst>
 </p1510:revInfo>
 </file>
@@ -149,8 +151,8 @@
 <pc:chgInfo xmlns:a="http://schemas.openxmlformats.org/drawingml/2006/main" xmlns:r="http://schemas.openxmlformats.org/officeDocument/2006/relationships" xmlns:ac="http://schemas.microsoft.com/office/drawing/2013/main/command" xmlns:pc="http://schemas.microsoft.com/office/powerpoint/2013/main/command">
   <pc:docChgLst>
     <pc:chgData name="Harsh Prasad" userId="2ad9fc3f20fb068c" providerId="LiveId" clId="{D8878F65-7AB4-48C1-9536-C2A9B7322A3A}"/>
-    <pc:docChg chg="modSld">
-      <pc:chgData name="Harsh Prasad" userId="2ad9fc3f20fb068c" providerId="LiveId" clId="{D8878F65-7AB4-48C1-9536-C2A9B7322A3A}" dt="2025-04-03T15:34:19.872" v="4"/>
+    <pc:docChg chg="custSel addSld delSld modSld">
+      <pc:chgData name="Harsh Prasad" userId="2ad9fc3f20fb068c" providerId="LiveId" clId="{D8878F65-7AB4-48C1-9536-C2A9B7322A3A}" dt="2025-04-03T18:14:41.785" v="479" actId="1076"/>
       <pc:docMkLst>
         <pc:docMk/>
       </pc:docMkLst>
@@ -168,6 +170,128 @@
             <ac:picMk id="2050" creationId="{BFA9FA35-6142-3868-BA0B-862754CBFE4B}"/>
           </ac:picMkLst>
         </pc:picChg>
+      </pc:sldChg>
+      <pc:sldChg chg="modSp mod">
+        <pc:chgData name="Harsh Prasad" userId="2ad9fc3f20fb068c" providerId="LiveId" clId="{D8878F65-7AB4-48C1-9536-C2A9B7322A3A}" dt="2025-04-03T17:59:09.696" v="10" actId="20577"/>
+        <pc:sldMkLst>
+          <pc:docMk/>
+          <pc:sldMk cId="3990171912" sldId="1924"/>
+        </pc:sldMkLst>
+        <pc:spChg chg="mod">
+          <ac:chgData name="Harsh Prasad" userId="2ad9fc3f20fb068c" providerId="LiveId" clId="{D8878F65-7AB4-48C1-9536-C2A9B7322A3A}" dt="2025-04-03T17:59:09.696" v="10" actId="20577"/>
+          <ac:spMkLst>
+            <pc:docMk/>
+            <pc:sldMk cId="3990171912" sldId="1924"/>
+            <ac:spMk id="4" creationId="{C87169C0-7EAF-938E-14B7-CF06762D00F3}"/>
+          </ac:spMkLst>
+        </pc:spChg>
+      </pc:sldChg>
+      <pc:sldChg chg="modSp mod">
+        <pc:chgData name="Harsh Prasad" userId="2ad9fc3f20fb068c" providerId="LiveId" clId="{D8878F65-7AB4-48C1-9536-C2A9B7322A3A}" dt="2025-04-03T17:59:59.063" v="16" actId="1076"/>
+        <pc:sldMkLst>
+          <pc:docMk/>
+          <pc:sldMk cId="2159875524" sldId="1938"/>
+        </pc:sldMkLst>
+        <pc:spChg chg="mod">
+          <ac:chgData name="Harsh Prasad" userId="2ad9fc3f20fb068c" providerId="LiveId" clId="{D8878F65-7AB4-48C1-9536-C2A9B7322A3A}" dt="2025-04-03T17:59:59.063" v="16" actId="1076"/>
+          <ac:spMkLst>
+            <pc:docMk/>
+            <pc:sldMk cId="2159875524" sldId="1938"/>
+            <ac:spMk id="2" creationId="{5D6C1135-7FCF-C376-AD00-D7F13B6C32B2}"/>
+          </ac:spMkLst>
+        </pc:spChg>
+        <pc:spChg chg="mod">
+          <ac:chgData name="Harsh Prasad" userId="2ad9fc3f20fb068c" providerId="LiveId" clId="{D8878F65-7AB4-48C1-9536-C2A9B7322A3A}" dt="2025-04-03T17:59:38.088" v="14" actId="20577"/>
+          <ac:spMkLst>
+            <pc:docMk/>
+            <pc:sldMk cId="2159875524" sldId="1938"/>
+            <ac:spMk id="18" creationId="{57D62F16-F75C-6B98-2080-BECC2DE82C16}"/>
+          </ac:spMkLst>
+        </pc:spChg>
+      </pc:sldChg>
+      <pc:sldChg chg="modSp mod">
+        <pc:chgData name="Harsh Prasad" userId="2ad9fc3f20fb068c" providerId="LiveId" clId="{D8878F65-7AB4-48C1-9536-C2A9B7322A3A}" dt="2025-04-03T17:58:30.655" v="5" actId="1076"/>
+        <pc:sldMkLst>
+          <pc:docMk/>
+          <pc:sldMk cId="1917596457" sldId="1940"/>
+        </pc:sldMkLst>
+        <pc:spChg chg="mod">
+          <ac:chgData name="Harsh Prasad" userId="2ad9fc3f20fb068c" providerId="LiveId" clId="{D8878F65-7AB4-48C1-9536-C2A9B7322A3A}" dt="2025-04-03T17:58:30.655" v="5" actId="1076"/>
+          <ac:spMkLst>
+            <pc:docMk/>
+            <pc:sldMk cId="1917596457" sldId="1940"/>
+            <ac:spMk id="14" creationId="{0D40A596-7E8D-EE20-6856-8444630272BA}"/>
+          </ac:spMkLst>
+        </pc:spChg>
+      </pc:sldChg>
+      <pc:sldChg chg="addSp delSp modSp new mod">
+        <pc:chgData name="Harsh Prasad" userId="2ad9fc3f20fb068c" providerId="LiveId" clId="{D8878F65-7AB4-48C1-9536-C2A9B7322A3A}" dt="2025-04-03T18:07:03.741" v="58" actId="14100"/>
+        <pc:sldMkLst>
+          <pc:docMk/>
+          <pc:sldMk cId="688813165" sldId="1942"/>
+        </pc:sldMkLst>
+        <pc:spChg chg="mod">
+          <ac:chgData name="Harsh Prasad" userId="2ad9fc3f20fb068c" providerId="LiveId" clId="{D8878F65-7AB4-48C1-9536-C2A9B7322A3A}" dt="2025-04-03T18:06:42.073" v="57" actId="207"/>
+          <ac:spMkLst>
+            <pc:docMk/>
+            <pc:sldMk cId="688813165" sldId="1942"/>
+            <ac:spMk id="2" creationId="{9D2A9EF8-5DAA-6FE9-4E77-51297A254889}"/>
+          </ac:spMkLst>
+        </pc:spChg>
+        <pc:spChg chg="add del mod">
+          <ac:chgData name="Harsh Prasad" userId="2ad9fc3f20fb068c" providerId="LiveId" clId="{D8878F65-7AB4-48C1-9536-C2A9B7322A3A}" dt="2025-04-03T18:03:48.944" v="34" actId="478"/>
+          <ac:spMkLst>
+            <pc:docMk/>
+            <pc:sldMk cId="688813165" sldId="1942"/>
+            <ac:spMk id="3" creationId="{53401538-2627-5465-A912-9B40ABBB40D2}"/>
+          </ac:spMkLst>
+        </pc:spChg>
+        <pc:spChg chg="add mod">
+          <ac:chgData name="Harsh Prasad" userId="2ad9fc3f20fb068c" providerId="LiveId" clId="{D8878F65-7AB4-48C1-9536-C2A9B7322A3A}" dt="2025-04-03T18:07:03.741" v="58" actId="14100"/>
+          <ac:spMkLst>
+            <pc:docMk/>
+            <pc:sldMk cId="688813165" sldId="1942"/>
+            <ac:spMk id="4" creationId="{3CF2C384-E6E7-60D4-686F-0D56398F6590}"/>
+          </ac:spMkLst>
+        </pc:spChg>
+      </pc:sldChg>
+      <pc:sldChg chg="addSp delSp modSp add mod">
+        <pc:chgData name="Harsh Prasad" userId="2ad9fc3f20fb068c" providerId="LiveId" clId="{D8878F65-7AB4-48C1-9536-C2A9B7322A3A}" dt="2025-04-03T18:14:41.785" v="479" actId="1076"/>
+        <pc:sldMkLst>
+          <pc:docMk/>
+          <pc:sldMk cId="1376287279" sldId="1943"/>
+        </pc:sldMkLst>
+        <pc:spChg chg="mod">
+          <ac:chgData name="Harsh Prasad" userId="2ad9fc3f20fb068c" providerId="LiveId" clId="{D8878F65-7AB4-48C1-9536-C2A9B7322A3A}" dt="2025-04-03T18:08:42.175" v="84" actId="20577"/>
+          <ac:spMkLst>
+            <pc:docMk/>
+            <pc:sldMk cId="1376287279" sldId="1943"/>
+            <ac:spMk id="2" creationId="{7B620C8B-E12F-0982-06D0-7752A39C53F1}"/>
+          </ac:spMkLst>
+        </pc:spChg>
+        <pc:spChg chg="add mod">
+          <ac:chgData name="Harsh Prasad" userId="2ad9fc3f20fb068c" providerId="LiveId" clId="{D8878F65-7AB4-48C1-9536-C2A9B7322A3A}" dt="2025-04-03T18:14:41.785" v="479" actId="1076"/>
+          <ac:spMkLst>
+            <pc:docMk/>
+            <pc:sldMk cId="1376287279" sldId="1943"/>
+            <ac:spMk id="3" creationId="{DD0E911C-F202-0567-E377-77B163511BB3}"/>
+          </ac:spMkLst>
+        </pc:spChg>
+        <pc:spChg chg="del">
+          <ac:chgData name="Harsh Prasad" userId="2ad9fc3f20fb068c" providerId="LiveId" clId="{D8878F65-7AB4-48C1-9536-C2A9B7322A3A}" dt="2025-04-03T18:08:48.561" v="86" actId="478"/>
+          <ac:spMkLst>
+            <pc:docMk/>
+            <pc:sldMk cId="1376287279" sldId="1943"/>
+            <ac:spMk id="4" creationId="{79D5378E-BCF6-5066-0B28-8ED8D12E1ECE}"/>
+          </ac:spMkLst>
+        </pc:spChg>
+      </pc:sldChg>
+      <pc:sldChg chg="new del">
+        <pc:chgData name="Harsh Prasad" userId="2ad9fc3f20fb068c" providerId="LiveId" clId="{D8878F65-7AB4-48C1-9536-C2A9B7322A3A}" dt="2025-04-03T18:07:15.004" v="60" actId="47"/>
+        <pc:sldMkLst>
+          <pc:docMk/>
+          <pc:sldMk cId="2573267571" sldId="1943"/>
+        </pc:sldMkLst>
       </pc:sldChg>
     </pc:docChg>
   </pc:docChgLst>
@@ -10247,7 +10371,7 @@
                 <a:latin typeface="Segoe UI Semibold" panose="020B0502040204020203" pitchFamily="34" charset="0"/>
                 <a:cs typeface="Segoe UI Semibold" panose="020B0502040204020203" pitchFamily="34" charset="0"/>
               </a:rPr>
-              <a:t>Transforms blurry images into crystal clear photos</a:t>
+              <a:t>Transforming blurry images into crystal clear photos</a:t>
             </a:r>
             <a:endParaRPr lang="en-US" sz="2200" b="1" dirty="0">
               <a:solidFill>
@@ -10273,7 +10397,7 @@
         </p:nvSpPr>
         <p:spPr>
           <a:xfrm>
-            <a:off x="10142290" y="5641848"/>
+            <a:off x="10326847" y="5657671"/>
             <a:ext cx="2231472" cy="1200329"/>
           </a:xfrm>
           <a:prstGeom prst="rect">
@@ -10448,7 +10572,7 @@
           <a:p>
             <a:r>
               <a:rPr lang="en-US" dirty="0"/>
-              <a:t>Underlying Model Architecture</a:t>
+              <a:t>Underlying Model Architecture: CNN</a:t>
             </a:r>
           </a:p>
         </p:txBody>
@@ -11871,6 +11995,1012 @@
 </file>
 
 <file path=ppt/slides/slide4.xml><?xml version="1.0" encoding="utf-8"?>
+<p:sld xmlns:a="http://schemas.openxmlformats.org/drawingml/2006/main" xmlns:r="http://schemas.openxmlformats.org/officeDocument/2006/relationships" xmlns:p="http://schemas.openxmlformats.org/presentationml/2006/main">
+  <p:cSld>
+    <p:spTree>
+      <p:nvGrpSpPr>
+        <p:cNvPr id="1" name=""/>
+        <p:cNvGrpSpPr/>
+        <p:nvPr/>
+      </p:nvGrpSpPr>
+      <p:grpSpPr>
+        <a:xfrm>
+          <a:off x="0" y="0"/>
+          <a:ext cx="0" cy="0"/>
+          <a:chOff x="0" y="0"/>
+          <a:chExt cx="0" cy="0"/>
+        </a:xfrm>
+      </p:grpSpPr>
+      <p:sp>
+        <p:nvSpPr>
+          <p:cNvPr id="2" name="Title 1">
+            <a:extLst>
+              <a:ext uri="{FF2B5EF4-FFF2-40B4-BE49-F238E27FC236}">
+                <a16:creationId xmlns:a16="http://schemas.microsoft.com/office/drawing/2014/main" id="{9D2A9EF8-5DAA-6FE9-4E77-51297A254889}"/>
+              </a:ext>
+            </a:extLst>
+          </p:cNvPr>
+          <p:cNvSpPr>
+            <a:spLocks noGrp="1"/>
+          </p:cNvSpPr>
+          <p:nvPr>
+            <p:ph type="title"/>
+          </p:nvPr>
+        </p:nvSpPr>
+        <p:spPr/>
+        <p:txBody>
+          <a:bodyPr/>
+          <a:lstStyle/>
+          <a:p>
+            <a:r>
+              <a:rPr lang="en-IN" dirty="0">
+                <a:solidFill>
+                  <a:schemeClr val="accent5">
+                    <a:lumMod val="50000"/>
+                  </a:schemeClr>
+                </a:solidFill>
+              </a:rPr>
+              <a:t>Why CNN?</a:t>
+            </a:r>
+          </a:p>
+        </p:txBody>
+      </p:sp>
+      <p:sp>
+        <p:nvSpPr>
+          <p:cNvPr id="4" name="Rectangle 1">
+            <a:extLst>
+              <a:ext uri="{FF2B5EF4-FFF2-40B4-BE49-F238E27FC236}">
+                <a16:creationId xmlns:a16="http://schemas.microsoft.com/office/drawing/2014/main" id="{3CF2C384-E6E7-60D4-686F-0D56398F6590}"/>
+              </a:ext>
+            </a:extLst>
+          </p:cNvPr>
+          <p:cNvSpPr>
+            <a:spLocks noChangeArrowheads="1"/>
+          </p:cNvSpPr>
+          <p:nvPr/>
+        </p:nvSpPr>
+        <p:spPr bwMode="auto">
+          <a:xfrm>
+            <a:off x="352338" y="1355920"/>
+            <a:ext cx="11552278" cy="5262979"/>
+          </a:xfrm>
+          <a:prstGeom prst="rect">
+            <a:avLst/>
+          </a:prstGeom>
+          <a:noFill/>
+          <a:ln>
+            <a:noFill/>
+          </a:ln>
+          <a:effectLst/>
+          <a:extLst>
+            <a:ext uri="{909E8E84-426E-40DD-AFC4-6F175D3DCCD1}">
+              <a14:hiddenFill xmlns:a14="http://schemas.microsoft.com/office/drawing/2010/main">
+                <a:solidFill>
+                  <a:schemeClr val="accent1"/>
+                </a:solidFill>
+              </a14:hiddenFill>
+            </a:ext>
+            <a:ext uri="{91240B29-F687-4F45-9708-019B960494DF}">
+              <a14:hiddenLine xmlns:a14="http://schemas.microsoft.com/office/drawing/2010/main" w="9525">
+                <a:solidFill>
+                  <a:schemeClr val="tx1"/>
+                </a:solidFill>
+                <a:miter lim="800000"/>
+                <a:headEnd/>
+                <a:tailEnd/>
+              </a14:hiddenLine>
+            </a:ext>
+            <a:ext uri="{AF507438-7753-43E0-B8FC-AC1667EBCBE1}">
+              <a14:hiddenEffects xmlns:a14="http://schemas.microsoft.com/office/drawing/2010/main">
+                <a:effectLst>
+                  <a:outerShdw dist="35921" dir="2700000" algn="ctr" rotWithShape="0">
+                    <a:schemeClr val="bg2"/>
+                  </a:outerShdw>
+                </a:effectLst>
+              </a14:hiddenEffects>
+            </a:ext>
+          </a:extLst>
+        </p:spPr>
+        <p:txBody>
+          <a:bodyPr vert="horz" wrap="square" lIns="91440" tIns="45720" rIns="91440" bIns="45720" numCol="1" anchor="ctr" anchorCtr="0" compatLnSpc="1">
+            <a:prstTxWarp prst="textNoShape">
+              <a:avLst/>
+            </a:prstTxWarp>
+            <a:spAutoFit/>
+          </a:bodyPr>
+          <a:lstStyle/>
+          <a:p>
+            <a:pPr marL="342900" marR="0" lvl="0" indent="-342900" algn="l" defTabSz="914400" rtl="0" eaLnBrk="0" fontAlgn="base" latinLnBrk="0" hangingPunct="0">
+              <a:lnSpc>
+                <a:spcPct val="100000"/>
+              </a:lnSpc>
+              <a:spcBef>
+                <a:spcPct val="0"/>
+              </a:spcBef>
+              <a:spcAft>
+                <a:spcPct val="0"/>
+              </a:spcAft>
+              <a:buClrTx/>
+              <a:buSzTx/>
+              <a:buFont typeface="Wingdings" panose="05000000000000000000" pitchFamily="2" charset="2"/>
+              <a:buChar char="v"/>
+              <a:tabLst/>
+            </a:pPr>
+            <a:r>
+              <a:rPr kumimoji="0" lang="en-US" altLang="en-US" sz="2400" b="1" i="0" u="none" strike="noStrike" cap="none" normalizeH="0" baseline="0" dirty="0">
+                <a:ln>
+                  <a:noFill/>
+                </a:ln>
+                <a:solidFill>
+                  <a:srgbClr val="005F73"/>
+                </a:solidFill>
+                <a:effectLst/>
+                <a:latin typeface="Arial" panose="020B0604020202020204" pitchFamily="34" charset="0"/>
+              </a:rPr>
+              <a:t>Understands Image Details</a:t>
+            </a:r>
+            <a:r>
+              <a:rPr kumimoji="0" lang="en-US" altLang="en-US" sz="2400" b="0" i="0" u="none" strike="noStrike" cap="none" normalizeH="0" baseline="0" dirty="0">
+                <a:ln>
+                  <a:noFill/>
+                </a:ln>
+                <a:solidFill>
+                  <a:srgbClr val="005F73"/>
+                </a:solidFill>
+                <a:effectLst/>
+                <a:latin typeface="Arial" panose="020B0604020202020204" pitchFamily="34" charset="0"/>
+              </a:rPr>
+              <a:t>: CNNs can recognize edges, textures, and patterns, which helps in sharpening blurry images.</a:t>
+            </a:r>
+          </a:p>
+          <a:p>
+            <a:pPr marL="342900" marR="0" lvl="0" indent="-342900" algn="l" defTabSz="914400" rtl="0" eaLnBrk="0" fontAlgn="base" latinLnBrk="0" hangingPunct="0">
+              <a:lnSpc>
+                <a:spcPct val="100000"/>
+              </a:lnSpc>
+              <a:spcBef>
+                <a:spcPct val="0"/>
+              </a:spcBef>
+              <a:spcAft>
+                <a:spcPct val="0"/>
+              </a:spcAft>
+              <a:buClrTx/>
+              <a:buSzTx/>
+              <a:buFont typeface="Wingdings" panose="05000000000000000000" pitchFamily="2" charset="2"/>
+              <a:buChar char="v"/>
+              <a:tabLst/>
+            </a:pPr>
+            <a:endParaRPr kumimoji="0" lang="en-US" altLang="en-US" sz="2400" b="0" i="0" u="none" strike="noStrike" cap="none" normalizeH="0" baseline="0" dirty="0">
+              <a:ln>
+                <a:noFill/>
+              </a:ln>
+              <a:solidFill>
+                <a:srgbClr val="005F73"/>
+              </a:solidFill>
+              <a:effectLst/>
+              <a:latin typeface="Arial" panose="020B0604020202020204" pitchFamily="34" charset="0"/>
+            </a:endParaRPr>
+          </a:p>
+          <a:p>
+            <a:pPr marL="342900" marR="0" lvl="0" indent="-342900" algn="l" defTabSz="914400" rtl="0" eaLnBrk="0" fontAlgn="base" latinLnBrk="0" hangingPunct="0">
+              <a:lnSpc>
+                <a:spcPct val="100000"/>
+              </a:lnSpc>
+              <a:spcBef>
+                <a:spcPct val="0"/>
+              </a:spcBef>
+              <a:spcAft>
+                <a:spcPct val="0"/>
+              </a:spcAft>
+              <a:buClrTx/>
+              <a:buSzTx/>
+              <a:buFont typeface="Wingdings" panose="05000000000000000000" pitchFamily="2" charset="2"/>
+              <a:buChar char="v"/>
+              <a:tabLst/>
+            </a:pPr>
+            <a:r>
+              <a:rPr kumimoji="0" lang="en-US" altLang="en-US" sz="2400" b="1" i="0" u="none" strike="noStrike" cap="none" normalizeH="0" baseline="0" dirty="0">
+                <a:ln>
+                  <a:noFill/>
+                </a:ln>
+                <a:solidFill>
+                  <a:srgbClr val="005F73"/>
+                </a:solidFill>
+                <a:effectLst/>
+                <a:latin typeface="Arial" panose="020B0604020202020204" pitchFamily="34" charset="0"/>
+              </a:rPr>
+              <a:t>Works Anywhere in the Image</a:t>
+            </a:r>
+            <a:r>
+              <a:rPr kumimoji="0" lang="en-US" altLang="en-US" sz="2400" b="0" i="0" u="none" strike="noStrike" cap="none" normalizeH="0" baseline="0" dirty="0">
+                <a:ln>
+                  <a:noFill/>
+                </a:ln>
+                <a:solidFill>
+                  <a:srgbClr val="005F73"/>
+                </a:solidFill>
+                <a:effectLst/>
+                <a:latin typeface="Arial" panose="020B0604020202020204" pitchFamily="34" charset="0"/>
+              </a:rPr>
+              <a:t>: Since CNNs use shared filters, they can detect blur no matter where it appears.</a:t>
+            </a:r>
+          </a:p>
+          <a:p>
+            <a:pPr marL="342900" marR="0" lvl="0" indent="-342900" algn="l" defTabSz="914400" rtl="0" eaLnBrk="0" fontAlgn="base" latinLnBrk="0" hangingPunct="0">
+              <a:lnSpc>
+                <a:spcPct val="100000"/>
+              </a:lnSpc>
+              <a:spcBef>
+                <a:spcPct val="0"/>
+              </a:spcBef>
+              <a:spcAft>
+                <a:spcPct val="0"/>
+              </a:spcAft>
+              <a:buClrTx/>
+              <a:buSzTx/>
+              <a:buFont typeface="Wingdings" panose="05000000000000000000" pitchFamily="2" charset="2"/>
+              <a:buChar char="v"/>
+              <a:tabLst/>
+            </a:pPr>
+            <a:endParaRPr kumimoji="0" lang="en-US" altLang="en-US" sz="2400" b="0" i="0" u="none" strike="noStrike" cap="none" normalizeH="0" baseline="0" dirty="0">
+              <a:ln>
+                <a:noFill/>
+              </a:ln>
+              <a:solidFill>
+                <a:srgbClr val="005F73"/>
+              </a:solidFill>
+              <a:effectLst/>
+              <a:latin typeface="Arial" panose="020B0604020202020204" pitchFamily="34" charset="0"/>
+            </a:endParaRPr>
+          </a:p>
+          <a:p>
+            <a:pPr marL="342900" marR="0" lvl="0" indent="-342900" algn="l" defTabSz="914400" rtl="0" eaLnBrk="0" fontAlgn="base" latinLnBrk="0" hangingPunct="0">
+              <a:lnSpc>
+                <a:spcPct val="100000"/>
+              </a:lnSpc>
+              <a:spcBef>
+                <a:spcPct val="0"/>
+              </a:spcBef>
+              <a:spcAft>
+                <a:spcPct val="0"/>
+              </a:spcAft>
+              <a:buClrTx/>
+              <a:buSzTx/>
+              <a:buFont typeface="Wingdings" panose="05000000000000000000" pitchFamily="2" charset="2"/>
+              <a:buChar char="v"/>
+              <a:tabLst/>
+            </a:pPr>
+            <a:r>
+              <a:rPr kumimoji="0" lang="en-US" altLang="en-US" sz="2400" b="1" i="0" u="none" strike="noStrike" cap="none" normalizeH="0" baseline="0" dirty="0">
+                <a:ln>
+                  <a:noFill/>
+                </a:ln>
+                <a:solidFill>
+                  <a:srgbClr val="005F73"/>
+                </a:solidFill>
+                <a:effectLst/>
+                <a:latin typeface="Arial" panose="020B0604020202020204" pitchFamily="34" charset="0"/>
+              </a:rPr>
+              <a:t>Focuses on Small Areas</a:t>
+            </a:r>
+            <a:r>
+              <a:rPr kumimoji="0" lang="en-US" altLang="en-US" sz="2400" b="0" i="0" u="none" strike="noStrike" cap="none" normalizeH="0" baseline="0" dirty="0">
+                <a:ln>
+                  <a:noFill/>
+                </a:ln>
+                <a:solidFill>
+                  <a:srgbClr val="005F73"/>
+                </a:solidFill>
+                <a:effectLst/>
+                <a:latin typeface="Arial" panose="020B0604020202020204" pitchFamily="34" charset="0"/>
+              </a:rPr>
+              <a:t>: CNNs analyze small parts of an image, making them great for spotting and fixing blurry regions.</a:t>
+            </a:r>
+          </a:p>
+          <a:p>
+            <a:pPr marL="342900" marR="0" lvl="0" indent="-342900" algn="l" defTabSz="914400" rtl="0" eaLnBrk="0" fontAlgn="base" latinLnBrk="0" hangingPunct="0">
+              <a:lnSpc>
+                <a:spcPct val="100000"/>
+              </a:lnSpc>
+              <a:spcBef>
+                <a:spcPct val="0"/>
+              </a:spcBef>
+              <a:spcAft>
+                <a:spcPct val="0"/>
+              </a:spcAft>
+              <a:buClrTx/>
+              <a:buSzTx/>
+              <a:buFont typeface="Wingdings" panose="05000000000000000000" pitchFamily="2" charset="2"/>
+              <a:buChar char="v"/>
+              <a:tabLst/>
+            </a:pPr>
+            <a:endParaRPr kumimoji="0" lang="en-US" altLang="en-US" sz="2400" b="0" i="0" u="none" strike="noStrike" cap="none" normalizeH="0" baseline="0" dirty="0">
+              <a:ln>
+                <a:noFill/>
+              </a:ln>
+              <a:solidFill>
+                <a:srgbClr val="005F73"/>
+              </a:solidFill>
+              <a:effectLst/>
+              <a:latin typeface="Arial" panose="020B0604020202020204" pitchFamily="34" charset="0"/>
+            </a:endParaRPr>
+          </a:p>
+          <a:p>
+            <a:pPr marL="342900" marR="0" lvl="0" indent="-342900" algn="l" defTabSz="914400" rtl="0" eaLnBrk="0" fontAlgn="base" latinLnBrk="0" hangingPunct="0">
+              <a:lnSpc>
+                <a:spcPct val="100000"/>
+              </a:lnSpc>
+              <a:spcBef>
+                <a:spcPct val="0"/>
+              </a:spcBef>
+              <a:spcAft>
+                <a:spcPct val="0"/>
+              </a:spcAft>
+              <a:buClrTx/>
+              <a:buSzTx/>
+              <a:buFont typeface="Wingdings" panose="05000000000000000000" pitchFamily="2" charset="2"/>
+              <a:buChar char="v"/>
+              <a:tabLst/>
+            </a:pPr>
+            <a:r>
+              <a:rPr kumimoji="0" lang="en-US" altLang="en-US" sz="2400" b="1" i="0" u="none" strike="noStrike" cap="none" normalizeH="0" baseline="0" dirty="0">
+                <a:ln>
+                  <a:noFill/>
+                </a:ln>
+                <a:solidFill>
+                  <a:srgbClr val="005F73"/>
+                </a:solidFill>
+                <a:effectLst/>
+                <a:latin typeface="Arial" panose="020B0604020202020204" pitchFamily="34" charset="0"/>
+              </a:rPr>
+              <a:t>Learns Automatically</a:t>
+            </a:r>
+            <a:r>
+              <a:rPr kumimoji="0" lang="en-US" altLang="en-US" sz="2400" b="0" i="0" u="none" strike="noStrike" cap="none" normalizeH="0" baseline="0" dirty="0">
+                <a:ln>
+                  <a:noFill/>
+                </a:ln>
+                <a:solidFill>
+                  <a:srgbClr val="005F73"/>
+                </a:solidFill>
+                <a:effectLst/>
+                <a:latin typeface="Arial" panose="020B0604020202020204" pitchFamily="34" charset="0"/>
+              </a:rPr>
+              <a:t>: The model learns directly from blurry and sharp image pairs, without needing manually created features.</a:t>
+            </a:r>
+          </a:p>
+          <a:p>
+            <a:pPr marL="342900" marR="0" lvl="0" indent="-342900" algn="l" defTabSz="914400" rtl="0" eaLnBrk="0" fontAlgn="base" latinLnBrk="0" hangingPunct="0">
+              <a:lnSpc>
+                <a:spcPct val="100000"/>
+              </a:lnSpc>
+              <a:spcBef>
+                <a:spcPct val="0"/>
+              </a:spcBef>
+              <a:spcAft>
+                <a:spcPct val="0"/>
+              </a:spcAft>
+              <a:buClrTx/>
+              <a:buSzTx/>
+              <a:buFont typeface="Wingdings" panose="05000000000000000000" pitchFamily="2" charset="2"/>
+              <a:buChar char="v"/>
+              <a:tabLst/>
+            </a:pPr>
+            <a:endParaRPr kumimoji="0" lang="en-US" altLang="en-US" sz="2400" b="0" i="0" u="none" strike="noStrike" cap="none" normalizeH="0" baseline="0" dirty="0">
+              <a:ln>
+                <a:noFill/>
+              </a:ln>
+              <a:solidFill>
+                <a:srgbClr val="005F73"/>
+              </a:solidFill>
+              <a:effectLst/>
+              <a:latin typeface="Arial" panose="020B0604020202020204" pitchFamily="34" charset="0"/>
+            </a:endParaRPr>
+          </a:p>
+          <a:p>
+            <a:pPr marL="342900" marR="0" lvl="0" indent="-342900" algn="l" defTabSz="914400" rtl="0" eaLnBrk="0" fontAlgn="base" latinLnBrk="0" hangingPunct="0">
+              <a:lnSpc>
+                <a:spcPct val="100000"/>
+              </a:lnSpc>
+              <a:spcBef>
+                <a:spcPct val="0"/>
+              </a:spcBef>
+              <a:spcAft>
+                <a:spcPct val="0"/>
+              </a:spcAft>
+              <a:buClrTx/>
+              <a:buSzTx/>
+              <a:buFont typeface="Wingdings" panose="05000000000000000000" pitchFamily="2" charset="2"/>
+              <a:buChar char="v"/>
+              <a:tabLst/>
+            </a:pPr>
+            <a:r>
+              <a:rPr kumimoji="0" lang="en-US" altLang="en-US" sz="2400" b="1" i="0" u="none" strike="noStrike" cap="none" normalizeH="0" baseline="0" dirty="0">
+                <a:ln>
+                  <a:noFill/>
+                </a:ln>
+                <a:solidFill>
+                  <a:srgbClr val="005F73"/>
+                </a:solidFill>
+                <a:effectLst/>
+                <a:latin typeface="Arial" panose="020B0604020202020204" pitchFamily="34" charset="0"/>
+              </a:rPr>
+              <a:t>Fixes Different Types of Blur</a:t>
+            </a:r>
+            <a:r>
+              <a:rPr kumimoji="0" lang="en-US" altLang="en-US" sz="2400" b="0" i="0" u="none" strike="noStrike" cap="none" normalizeH="0" baseline="0" dirty="0">
+                <a:ln>
+                  <a:noFill/>
+                </a:ln>
+                <a:solidFill>
+                  <a:srgbClr val="005F73"/>
+                </a:solidFill>
+                <a:effectLst/>
+                <a:latin typeface="Arial" panose="020B0604020202020204" pitchFamily="34" charset="0"/>
+              </a:rPr>
+              <a:t>: CNNs can correct various blurs like motion blur and Gaussian blur without needing separate models.</a:t>
+            </a:r>
+          </a:p>
+        </p:txBody>
+      </p:sp>
+    </p:spTree>
+    <p:extLst>
+      <p:ext uri="{BB962C8B-B14F-4D97-AF65-F5344CB8AC3E}">
+        <p14:creationId xmlns:p14="http://schemas.microsoft.com/office/powerpoint/2010/main" val="688813165"/>
+      </p:ext>
+    </p:extLst>
+  </p:cSld>
+  <p:clrMapOvr>
+    <a:masterClrMapping/>
+  </p:clrMapOvr>
+</p:sld>
+</file>
+
+<file path=ppt/slides/slide5.xml><?xml version="1.0" encoding="utf-8"?>
+<p:sld xmlns:a="http://schemas.openxmlformats.org/drawingml/2006/main" xmlns:r="http://schemas.openxmlformats.org/officeDocument/2006/relationships" xmlns:p="http://schemas.openxmlformats.org/presentationml/2006/main">
+  <p:cSld>
+    <p:spTree>
+      <p:nvGrpSpPr>
+        <p:cNvPr id="1" name="">
+          <a:extLst>
+            <a:ext uri="{FF2B5EF4-FFF2-40B4-BE49-F238E27FC236}">
+              <a16:creationId xmlns:a16="http://schemas.microsoft.com/office/drawing/2014/main" id="{A46EE840-8D66-E264-8178-CA0D4B86F164}"/>
+            </a:ext>
+          </a:extLst>
+        </p:cNvPr>
+        <p:cNvGrpSpPr/>
+        <p:nvPr/>
+      </p:nvGrpSpPr>
+      <p:grpSpPr>
+        <a:xfrm>
+          <a:off x="0" y="0"/>
+          <a:ext cx="0" cy="0"/>
+          <a:chOff x="0" y="0"/>
+          <a:chExt cx="0" cy="0"/>
+        </a:xfrm>
+      </p:grpSpPr>
+      <p:sp>
+        <p:nvSpPr>
+          <p:cNvPr id="2" name="Title 1">
+            <a:extLst>
+              <a:ext uri="{FF2B5EF4-FFF2-40B4-BE49-F238E27FC236}">
+                <a16:creationId xmlns:a16="http://schemas.microsoft.com/office/drawing/2014/main" id="{7B620C8B-E12F-0982-06D0-7752A39C53F1}"/>
+              </a:ext>
+            </a:extLst>
+          </p:cNvPr>
+          <p:cNvSpPr>
+            <a:spLocks noGrp="1"/>
+          </p:cNvSpPr>
+          <p:nvPr>
+            <p:ph type="title"/>
+          </p:nvPr>
+        </p:nvSpPr>
+        <p:spPr/>
+        <p:txBody>
+          <a:bodyPr/>
+          <a:lstStyle/>
+          <a:p>
+            <a:r>
+              <a:rPr lang="en-IN" dirty="0">
+                <a:solidFill>
+                  <a:schemeClr val="accent5">
+                    <a:lumMod val="50000"/>
+                  </a:schemeClr>
+                </a:solidFill>
+              </a:rPr>
+              <a:t>Why Machine Learning?</a:t>
+            </a:r>
+          </a:p>
+        </p:txBody>
+      </p:sp>
+      <p:sp>
+        <p:nvSpPr>
+          <p:cNvPr id="3" name="Rectangle 1">
+            <a:extLst>
+              <a:ext uri="{FF2B5EF4-FFF2-40B4-BE49-F238E27FC236}">
+                <a16:creationId xmlns:a16="http://schemas.microsoft.com/office/drawing/2014/main" id="{DD0E911C-F202-0567-E377-77B163511BB3}"/>
+              </a:ext>
+            </a:extLst>
+          </p:cNvPr>
+          <p:cNvSpPr>
+            <a:spLocks noChangeArrowheads="1"/>
+          </p:cNvSpPr>
+          <p:nvPr/>
+        </p:nvSpPr>
+        <p:spPr bwMode="auto">
+          <a:xfrm>
+            <a:off x="521208" y="1803838"/>
+            <a:ext cx="9680895" cy="4093428"/>
+          </a:xfrm>
+          <a:prstGeom prst="rect">
+            <a:avLst/>
+          </a:prstGeom>
+          <a:noFill/>
+          <a:ln>
+            <a:noFill/>
+          </a:ln>
+          <a:effectLst/>
+          <a:extLst>
+            <a:ext uri="{909E8E84-426E-40DD-AFC4-6F175D3DCCD1}">
+              <a14:hiddenFill xmlns:a14="http://schemas.microsoft.com/office/drawing/2010/main">
+                <a:solidFill>
+                  <a:schemeClr val="accent1"/>
+                </a:solidFill>
+              </a14:hiddenFill>
+            </a:ext>
+            <a:ext uri="{91240B29-F687-4F45-9708-019B960494DF}">
+              <a14:hiddenLine xmlns:a14="http://schemas.microsoft.com/office/drawing/2010/main" w="9525">
+                <a:solidFill>
+                  <a:schemeClr val="tx1"/>
+                </a:solidFill>
+                <a:miter lim="800000"/>
+                <a:headEnd/>
+                <a:tailEnd/>
+              </a14:hiddenLine>
+            </a:ext>
+            <a:ext uri="{AF507438-7753-43E0-B8FC-AC1667EBCBE1}">
+              <a14:hiddenEffects xmlns:a14="http://schemas.microsoft.com/office/drawing/2010/main">
+                <a:effectLst>
+                  <a:outerShdw dist="35921" dir="2700000" algn="ctr" rotWithShape="0">
+                    <a:schemeClr val="bg2"/>
+                  </a:outerShdw>
+                </a:effectLst>
+              </a14:hiddenEffects>
+            </a:ext>
+          </a:extLst>
+        </p:spPr>
+        <p:txBody>
+          <a:bodyPr vert="horz" wrap="square" lIns="91440" tIns="45720" rIns="91440" bIns="45720" numCol="1" anchor="ctr" anchorCtr="0" compatLnSpc="1">
+            <a:prstTxWarp prst="textNoShape">
+              <a:avLst/>
+            </a:prstTxWarp>
+            <a:spAutoFit/>
+          </a:bodyPr>
+          <a:lstStyle/>
+          <a:p>
+            <a:pPr marL="285750" marR="0" lvl="0" indent="-285750" algn="l" defTabSz="914400" rtl="0" eaLnBrk="0" fontAlgn="base" latinLnBrk="0" hangingPunct="0">
+              <a:lnSpc>
+                <a:spcPct val="100000"/>
+              </a:lnSpc>
+              <a:spcBef>
+                <a:spcPct val="0"/>
+              </a:spcBef>
+              <a:spcAft>
+                <a:spcPct val="0"/>
+              </a:spcAft>
+              <a:buClrTx/>
+              <a:buSzTx/>
+              <a:buFont typeface="Wingdings" panose="05000000000000000000" pitchFamily="2" charset="2"/>
+              <a:buChar char="v"/>
+              <a:tabLst/>
+            </a:pPr>
+            <a:r>
+              <a:rPr kumimoji="0" lang="en-US" altLang="en-US" sz="2000" b="0" i="0" u="none" strike="noStrike" cap="none" normalizeH="0" baseline="0" dirty="0">
+                <a:ln>
+                  <a:noFill/>
+                </a:ln>
+                <a:solidFill>
+                  <a:schemeClr val="accent5">
+                    <a:lumMod val="50000"/>
+                  </a:schemeClr>
+                </a:solidFill>
+                <a:effectLst/>
+                <a:latin typeface="Arial" panose="020B0604020202020204" pitchFamily="34" charset="0"/>
+              </a:rPr>
+              <a:t>Adapts to different blur types.</a:t>
+            </a:r>
+          </a:p>
+          <a:p>
+            <a:pPr marL="285750" marR="0" lvl="0" indent="-285750" algn="l" defTabSz="914400" rtl="0" eaLnBrk="0" fontAlgn="base" latinLnBrk="0" hangingPunct="0">
+              <a:lnSpc>
+                <a:spcPct val="100000"/>
+              </a:lnSpc>
+              <a:spcBef>
+                <a:spcPct val="0"/>
+              </a:spcBef>
+              <a:spcAft>
+                <a:spcPct val="0"/>
+              </a:spcAft>
+              <a:buClrTx/>
+              <a:buSzTx/>
+              <a:buFont typeface="Wingdings" panose="05000000000000000000" pitchFamily="2" charset="2"/>
+              <a:buChar char="v"/>
+              <a:tabLst/>
+            </a:pPr>
+            <a:endParaRPr kumimoji="0" lang="en-US" altLang="en-US" sz="2000" b="0" i="0" u="none" strike="noStrike" cap="none" normalizeH="0" baseline="0" dirty="0">
+              <a:ln>
+                <a:noFill/>
+              </a:ln>
+              <a:solidFill>
+                <a:schemeClr val="accent5">
+                  <a:lumMod val="50000"/>
+                </a:schemeClr>
+              </a:solidFill>
+              <a:effectLst/>
+              <a:latin typeface="Arial" panose="020B0604020202020204" pitchFamily="34" charset="0"/>
+            </a:endParaRPr>
+          </a:p>
+          <a:p>
+            <a:pPr marL="285750" marR="0" lvl="0" indent="-285750" algn="l" defTabSz="914400" rtl="0" eaLnBrk="0" fontAlgn="base" latinLnBrk="0" hangingPunct="0">
+              <a:lnSpc>
+                <a:spcPct val="100000"/>
+              </a:lnSpc>
+              <a:spcBef>
+                <a:spcPct val="0"/>
+              </a:spcBef>
+              <a:spcAft>
+                <a:spcPct val="0"/>
+              </a:spcAft>
+              <a:buClrTx/>
+              <a:buSzTx/>
+              <a:buFont typeface="Wingdings" panose="05000000000000000000" pitchFamily="2" charset="2"/>
+              <a:buChar char="v"/>
+              <a:tabLst/>
+            </a:pPr>
+            <a:r>
+              <a:rPr lang="en-US" altLang="en-US" sz="2000" dirty="0">
+                <a:solidFill>
+                  <a:schemeClr val="accent5">
+                    <a:lumMod val="50000"/>
+                  </a:schemeClr>
+                </a:solidFill>
+                <a:latin typeface="Arial" panose="020B0604020202020204" pitchFamily="34" charset="0"/>
+              </a:rPr>
+              <a:t>Learns pattern, and not just rules.</a:t>
+            </a:r>
+          </a:p>
+          <a:p>
+            <a:pPr marL="285750" marR="0" lvl="0" indent="-285750" algn="l" defTabSz="914400" rtl="0" eaLnBrk="0" fontAlgn="base" latinLnBrk="0" hangingPunct="0">
+              <a:lnSpc>
+                <a:spcPct val="100000"/>
+              </a:lnSpc>
+              <a:spcBef>
+                <a:spcPct val="0"/>
+              </a:spcBef>
+              <a:spcAft>
+                <a:spcPct val="0"/>
+              </a:spcAft>
+              <a:buClrTx/>
+              <a:buSzTx/>
+              <a:buFont typeface="Wingdings" panose="05000000000000000000" pitchFamily="2" charset="2"/>
+              <a:buChar char="v"/>
+              <a:tabLst/>
+            </a:pPr>
+            <a:endParaRPr lang="en-US" altLang="en-US" sz="2000" dirty="0">
+              <a:solidFill>
+                <a:schemeClr val="accent5">
+                  <a:lumMod val="50000"/>
+                </a:schemeClr>
+              </a:solidFill>
+              <a:latin typeface="Arial" panose="020B0604020202020204" pitchFamily="34" charset="0"/>
+            </a:endParaRPr>
+          </a:p>
+          <a:p>
+            <a:pPr marL="285750" marR="0" lvl="0" indent="-285750" algn="l" defTabSz="914400" rtl="0" eaLnBrk="0" fontAlgn="base" latinLnBrk="0" hangingPunct="0">
+              <a:lnSpc>
+                <a:spcPct val="100000"/>
+              </a:lnSpc>
+              <a:spcBef>
+                <a:spcPct val="0"/>
+              </a:spcBef>
+              <a:spcAft>
+                <a:spcPct val="0"/>
+              </a:spcAft>
+              <a:buClrTx/>
+              <a:buSzTx/>
+              <a:buFont typeface="Wingdings" panose="05000000000000000000" pitchFamily="2" charset="2"/>
+              <a:buChar char="v"/>
+              <a:tabLst/>
+            </a:pPr>
+            <a:r>
+              <a:rPr kumimoji="0" lang="en-US" altLang="en-US" sz="2000" b="0" i="0" u="none" strike="noStrike" cap="none" normalizeH="0" baseline="0" dirty="0">
+                <a:ln>
+                  <a:noFill/>
+                </a:ln>
+                <a:solidFill>
+                  <a:schemeClr val="accent5">
+                    <a:lumMod val="50000"/>
+                  </a:schemeClr>
+                </a:solidFill>
+                <a:effectLst/>
+                <a:latin typeface="Arial" panose="020B0604020202020204" pitchFamily="34" charset="0"/>
+              </a:rPr>
+              <a:t>Handles complex and unknown blurs.</a:t>
+            </a:r>
+          </a:p>
+          <a:p>
+            <a:pPr marR="0" lvl="0" algn="l" defTabSz="914400" rtl="0" eaLnBrk="0" fontAlgn="base" latinLnBrk="0" hangingPunct="0">
+              <a:lnSpc>
+                <a:spcPct val="100000"/>
+              </a:lnSpc>
+              <a:spcBef>
+                <a:spcPct val="0"/>
+              </a:spcBef>
+              <a:spcAft>
+                <a:spcPct val="0"/>
+              </a:spcAft>
+              <a:buClrTx/>
+              <a:buSzTx/>
+              <a:tabLst/>
+            </a:pPr>
+            <a:endParaRPr kumimoji="0" lang="en-US" altLang="en-US" sz="2000" b="0" i="0" u="none" strike="noStrike" cap="none" normalizeH="0" baseline="0" dirty="0">
+              <a:ln>
+                <a:noFill/>
+              </a:ln>
+              <a:solidFill>
+                <a:schemeClr val="accent5">
+                  <a:lumMod val="50000"/>
+                </a:schemeClr>
+              </a:solidFill>
+              <a:effectLst/>
+              <a:latin typeface="Arial" panose="020B0604020202020204" pitchFamily="34" charset="0"/>
+            </a:endParaRPr>
+          </a:p>
+          <a:p>
+            <a:pPr marL="285750" marR="0" lvl="0" indent="-285750" algn="l" defTabSz="914400" rtl="0" eaLnBrk="0" fontAlgn="base" latinLnBrk="0" hangingPunct="0">
+              <a:lnSpc>
+                <a:spcPct val="100000"/>
+              </a:lnSpc>
+              <a:spcBef>
+                <a:spcPct val="0"/>
+              </a:spcBef>
+              <a:spcAft>
+                <a:spcPct val="0"/>
+              </a:spcAft>
+              <a:buClrTx/>
+              <a:buSzTx/>
+              <a:buFont typeface="Wingdings" panose="05000000000000000000" pitchFamily="2" charset="2"/>
+              <a:buChar char="v"/>
+              <a:tabLst/>
+            </a:pPr>
+            <a:r>
+              <a:rPr lang="en-US" altLang="en-US" sz="2000" dirty="0">
+                <a:solidFill>
+                  <a:schemeClr val="accent5">
+                    <a:lumMod val="50000"/>
+                  </a:schemeClr>
+                </a:solidFill>
+                <a:latin typeface="Arial" panose="020B0604020202020204" pitchFamily="34" charset="0"/>
+              </a:rPr>
+              <a:t>No need to manually design filters.</a:t>
+            </a:r>
+          </a:p>
+          <a:p>
+            <a:pPr marL="285750" marR="0" lvl="0" indent="-285750" algn="l" defTabSz="914400" rtl="0" eaLnBrk="0" fontAlgn="base" latinLnBrk="0" hangingPunct="0">
+              <a:lnSpc>
+                <a:spcPct val="100000"/>
+              </a:lnSpc>
+              <a:spcBef>
+                <a:spcPct val="0"/>
+              </a:spcBef>
+              <a:spcAft>
+                <a:spcPct val="0"/>
+              </a:spcAft>
+              <a:buClrTx/>
+              <a:buSzTx/>
+              <a:buFont typeface="Wingdings" panose="05000000000000000000" pitchFamily="2" charset="2"/>
+              <a:buChar char="v"/>
+              <a:tabLst/>
+            </a:pPr>
+            <a:endParaRPr lang="en-US" altLang="en-US" sz="2000" dirty="0">
+              <a:solidFill>
+                <a:schemeClr val="accent5">
+                  <a:lumMod val="50000"/>
+                </a:schemeClr>
+              </a:solidFill>
+              <a:latin typeface="Arial" panose="020B0604020202020204" pitchFamily="34" charset="0"/>
+            </a:endParaRPr>
+          </a:p>
+          <a:p>
+            <a:pPr marL="285750" marR="0" lvl="0" indent="-285750" algn="l" defTabSz="914400" rtl="0" eaLnBrk="0" fontAlgn="base" latinLnBrk="0" hangingPunct="0">
+              <a:lnSpc>
+                <a:spcPct val="100000"/>
+              </a:lnSpc>
+              <a:spcBef>
+                <a:spcPct val="0"/>
+              </a:spcBef>
+              <a:spcAft>
+                <a:spcPct val="0"/>
+              </a:spcAft>
+              <a:buClrTx/>
+              <a:buSzTx/>
+              <a:buFont typeface="Wingdings" panose="05000000000000000000" pitchFamily="2" charset="2"/>
+              <a:buChar char="v"/>
+              <a:tabLst/>
+            </a:pPr>
+            <a:r>
+              <a:rPr kumimoji="0" lang="en-US" altLang="en-US" sz="2000" b="0" i="0" u="none" strike="noStrike" cap="none" normalizeH="0" baseline="0" dirty="0">
+                <a:ln>
+                  <a:noFill/>
+                </a:ln>
+                <a:solidFill>
+                  <a:schemeClr val="accent5">
+                    <a:lumMod val="50000"/>
+                  </a:schemeClr>
+                </a:solidFill>
+                <a:effectLst/>
+                <a:latin typeface="Arial" panose="020B0604020202020204" pitchFamily="34" charset="0"/>
+              </a:rPr>
+              <a:t>Process images faster with the help of GPUs.</a:t>
+            </a:r>
+          </a:p>
+          <a:p>
+            <a:pPr marL="285750" marR="0" lvl="0" indent="-285750" algn="l" defTabSz="914400" rtl="0" eaLnBrk="0" fontAlgn="base" latinLnBrk="0" hangingPunct="0">
+              <a:lnSpc>
+                <a:spcPct val="100000"/>
+              </a:lnSpc>
+              <a:spcBef>
+                <a:spcPct val="0"/>
+              </a:spcBef>
+              <a:spcAft>
+                <a:spcPct val="0"/>
+              </a:spcAft>
+              <a:buClrTx/>
+              <a:buSzTx/>
+              <a:buFont typeface="Wingdings" panose="05000000000000000000" pitchFamily="2" charset="2"/>
+              <a:buChar char="v"/>
+              <a:tabLst/>
+            </a:pPr>
+            <a:endParaRPr kumimoji="0" lang="en-US" altLang="en-US" sz="2000" b="0" i="0" u="none" strike="noStrike" cap="none" normalizeH="0" baseline="0" dirty="0">
+              <a:ln>
+                <a:noFill/>
+              </a:ln>
+              <a:solidFill>
+                <a:schemeClr val="accent5">
+                  <a:lumMod val="50000"/>
+                </a:schemeClr>
+              </a:solidFill>
+              <a:effectLst/>
+              <a:latin typeface="Arial" panose="020B0604020202020204" pitchFamily="34" charset="0"/>
+            </a:endParaRPr>
+          </a:p>
+          <a:p>
+            <a:pPr marL="285750" marR="0" lvl="0" indent="-285750" algn="l" defTabSz="914400" rtl="0" eaLnBrk="0" fontAlgn="base" latinLnBrk="0" hangingPunct="0">
+              <a:lnSpc>
+                <a:spcPct val="100000"/>
+              </a:lnSpc>
+              <a:spcBef>
+                <a:spcPct val="0"/>
+              </a:spcBef>
+              <a:spcAft>
+                <a:spcPct val="0"/>
+              </a:spcAft>
+              <a:buClrTx/>
+              <a:buSzTx/>
+              <a:buFont typeface="Wingdings" panose="05000000000000000000" pitchFamily="2" charset="2"/>
+              <a:buChar char="v"/>
+              <a:tabLst/>
+            </a:pPr>
+            <a:r>
+              <a:rPr lang="en-US" altLang="en-US" sz="2000" dirty="0">
+                <a:solidFill>
+                  <a:schemeClr val="accent5">
+                    <a:lumMod val="50000"/>
+                  </a:schemeClr>
+                </a:solidFill>
+                <a:latin typeface="Arial" panose="020B0604020202020204" pitchFamily="34" charset="0"/>
+              </a:rPr>
+              <a:t>Gets better with more data over time.</a:t>
+            </a:r>
+          </a:p>
+          <a:p>
+            <a:pPr marL="285750" marR="0" lvl="0" indent="-285750" algn="l" defTabSz="914400" rtl="0" eaLnBrk="0" fontAlgn="base" latinLnBrk="0" hangingPunct="0">
+              <a:lnSpc>
+                <a:spcPct val="100000"/>
+              </a:lnSpc>
+              <a:spcBef>
+                <a:spcPct val="0"/>
+              </a:spcBef>
+              <a:spcAft>
+                <a:spcPct val="0"/>
+              </a:spcAft>
+              <a:buClrTx/>
+              <a:buSzTx/>
+              <a:buFont typeface="Wingdings" panose="05000000000000000000" pitchFamily="2" charset="2"/>
+              <a:buChar char="v"/>
+              <a:tabLst/>
+            </a:pPr>
+            <a:endParaRPr lang="en-US" altLang="en-US" sz="2000" dirty="0">
+              <a:solidFill>
+                <a:schemeClr val="accent5">
+                  <a:lumMod val="50000"/>
+                </a:schemeClr>
+              </a:solidFill>
+              <a:latin typeface="Arial" panose="020B0604020202020204" pitchFamily="34" charset="0"/>
+            </a:endParaRPr>
+          </a:p>
+          <a:p>
+            <a:pPr marL="285750" marR="0" lvl="0" indent="-285750" algn="l" defTabSz="914400" rtl="0" eaLnBrk="0" fontAlgn="base" latinLnBrk="0" hangingPunct="0">
+              <a:lnSpc>
+                <a:spcPct val="100000"/>
+              </a:lnSpc>
+              <a:spcBef>
+                <a:spcPct val="0"/>
+              </a:spcBef>
+              <a:spcAft>
+                <a:spcPct val="0"/>
+              </a:spcAft>
+              <a:buClrTx/>
+              <a:buSzTx/>
+              <a:buFont typeface="Wingdings" panose="05000000000000000000" pitchFamily="2" charset="2"/>
+              <a:buChar char="v"/>
+              <a:tabLst/>
+            </a:pPr>
+            <a:r>
+              <a:rPr kumimoji="0" lang="en-US" altLang="en-US" sz="2000" b="0" i="0" u="none" strike="noStrike" cap="none" normalizeH="0" baseline="0" dirty="0">
+                <a:ln>
+                  <a:noFill/>
+                </a:ln>
+                <a:solidFill>
+                  <a:schemeClr val="accent5">
+                    <a:lumMod val="50000"/>
+                  </a:schemeClr>
+                </a:solidFill>
+                <a:effectLst/>
+                <a:latin typeface="Arial" panose="020B0604020202020204" pitchFamily="34" charset="0"/>
+              </a:rPr>
+              <a:t>Learns aut</a:t>
+            </a:r>
+            <a:r>
+              <a:rPr lang="en-US" altLang="en-US" sz="2000" dirty="0">
+                <a:solidFill>
+                  <a:schemeClr val="accent5">
+                    <a:lumMod val="50000"/>
+                  </a:schemeClr>
+                </a:solidFill>
+                <a:latin typeface="Arial" panose="020B0604020202020204" pitchFamily="34" charset="0"/>
+              </a:rPr>
+              <a:t>omatically with data.</a:t>
+            </a:r>
+            <a:endParaRPr kumimoji="0" lang="en-US" altLang="en-US" sz="2000" b="0" i="0" u="none" strike="noStrike" cap="none" normalizeH="0" baseline="0" dirty="0">
+              <a:ln>
+                <a:noFill/>
+              </a:ln>
+              <a:solidFill>
+                <a:schemeClr val="accent5">
+                  <a:lumMod val="50000"/>
+                </a:schemeClr>
+              </a:solidFill>
+              <a:effectLst/>
+              <a:latin typeface="Arial" panose="020B0604020202020204" pitchFamily="34" charset="0"/>
+            </a:endParaRPr>
+          </a:p>
+        </p:txBody>
+      </p:sp>
+    </p:spTree>
+    <p:extLst>
+      <p:ext uri="{BB962C8B-B14F-4D97-AF65-F5344CB8AC3E}">
+        <p14:creationId xmlns:p14="http://schemas.microsoft.com/office/powerpoint/2010/main" val="1376287279"/>
+      </p:ext>
+    </p:extLst>
+  </p:cSld>
+  <p:clrMapOvr>
+    <a:masterClrMapping/>
+  </p:clrMapOvr>
+</p:sld>
+</file>
+
+<file path=ppt/slides/slide6.xml><?xml version="1.0" encoding="utf-8"?>
 <p:sld xmlns:a="http://schemas.openxmlformats.org/drawingml/2006/main" xmlns:r="http://schemas.openxmlformats.org/officeDocument/2006/relationships" xmlns:p="http://schemas.openxmlformats.org/presentationml/2006/main">
   <p:cSld>
     <p:spTree>
@@ -12022,7 +13152,7 @@
 </p:sld>
 </file>
 
-<file path=ppt/slides/slide5.xml><?xml version="1.0" encoding="utf-8"?>
+<file path=ppt/slides/slide7.xml><?xml version="1.0" encoding="utf-8"?>
 <p:sld xmlns:a="http://schemas.openxmlformats.org/drawingml/2006/main" xmlns:r="http://schemas.openxmlformats.org/officeDocument/2006/relationships" xmlns:p="http://schemas.openxmlformats.org/presentationml/2006/main">
   <p:cSld>
     <p:spTree>
@@ -12372,7 +13502,7 @@
 </p:sld>
 </file>
 
-<file path=ppt/slides/slide6.xml><?xml version="1.0" encoding="utf-8"?>
+<file path=ppt/slides/slide8.xml><?xml version="1.0" encoding="utf-8"?>
 <p:sld xmlns:a="http://schemas.openxmlformats.org/drawingml/2006/main" xmlns:r="http://schemas.openxmlformats.org/officeDocument/2006/relationships" xmlns:p="http://schemas.openxmlformats.org/presentationml/2006/main">
   <p:cSld>
     <p:spTree>
@@ -12403,7 +13533,7 @@
         </p:nvSpPr>
         <p:spPr>
           <a:xfrm>
-            <a:off x="170576" y="2399252"/>
+            <a:off x="2477548" y="2644170"/>
             <a:ext cx="7236903" cy="1569660"/>
           </a:xfrm>
           <a:prstGeom prst="rect">

</xml_diff>